<commit_message>
extended version before meeting confirmation
</commit_message>
<xml_diff>
--- a/extended version/get_I_score.pptx
+++ b/extended version/get_I_score.pptx
@@ -243,7 +243,7 @@
           <a:p>
             <a:fld id="{185F0BFD-5608-4F22-A047-776EBFDB86C9}" type="datetimeFigureOut">
               <a:rPr lang="en-AU" smtClean="0"/>
-              <a:t>21/08/2018</a:t>
+              <a:t>17/09/2018</a:t>
             </a:fld>
             <a:endParaRPr lang="en-AU"/>
           </a:p>
@@ -413,7 +413,7 @@
           <a:p>
             <a:fld id="{185F0BFD-5608-4F22-A047-776EBFDB86C9}" type="datetimeFigureOut">
               <a:rPr lang="en-AU" smtClean="0"/>
-              <a:t>21/08/2018</a:t>
+              <a:t>17/09/2018</a:t>
             </a:fld>
             <a:endParaRPr lang="en-AU"/>
           </a:p>
@@ -593,7 +593,7 @@
           <a:p>
             <a:fld id="{185F0BFD-5608-4F22-A047-776EBFDB86C9}" type="datetimeFigureOut">
               <a:rPr lang="en-AU" smtClean="0"/>
-              <a:t>21/08/2018</a:t>
+              <a:t>17/09/2018</a:t>
             </a:fld>
             <a:endParaRPr lang="en-AU"/>
           </a:p>
@@ -763,7 +763,7 @@
           <a:p>
             <a:fld id="{185F0BFD-5608-4F22-A047-776EBFDB86C9}" type="datetimeFigureOut">
               <a:rPr lang="en-AU" smtClean="0"/>
-              <a:t>21/08/2018</a:t>
+              <a:t>17/09/2018</a:t>
             </a:fld>
             <a:endParaRPr lang="en-AU"/>
           </a:p>
@@ -1009,7 +1009,7 @@
           <a:p>
             <a:fld id="{185F0BFD-5608-4F22-A047-776EBFDB86C9}" type="datetimeFigureOut">
               <a:rPr lang="en-AU" smtClean="0"/>
-              <a:t>21/08/2018</a:t>
+              <a:t>17/09/2018</a:t>
             </a:fld>
             <a:endParaRPr lang="en-AU"/>
           </a:p>
@@ -1241,7 +1241,7 @@
           <a:p>
             <a:fld id="{185F0BFD-5608-4F22-A047-776EBFDB86C9}" type="datetimeFigureOut">
               <a:rPr lang="en-AU" smtClean="0"/>
-              <a:t>21/08/2018</a:t>
+              <a:t>17/09/2018</a:t>
             </a:fld>
             <a:endParaRPr lang="en-AU"/>
           </a:p>
@@ -1608,7 +1608,7 @@
           <a:p>
             <a:fld id="{185F0BFD-5608-4F22-A047-776EBFDB86C9}" type="datetimeFigureOut">
               <a:rPr lang="en-AU" smtClean="0"/>
-              <a:t>21/08/2018</a:t>
+              <a:t>17/09/2018</a:t>
             </a:fld>
             <a:endParaRPr lang="en-AU"/>
           </a:p>
@@ -1726,7 +1726,7 @@
           <a:p>
             <a:fld id="{185F0BFD-5608-4F22-A047-776EBFDB86C9}" type="datetimeFigureOut">
               <a:rPr lang="en-AU" smtClean="0"/>
-              <a:t>21/08/2018</a:t>
+              <a:t>17/09/2018</a:t>
             </a:fld>
             <a:endParaRPr lang="en-AU"/>
           </a:p>
@@ -1821,7 +1821,7 @@
           <a:p>
             <a:fld id="{185F0BFD-5608-4F22-A047-776EBFDB86C9}" type="datetimeFigureOut">
               <a:rPr lang="en-AU" smtClean="0"/>
-              <a:t>21/08/2018</a:t>
+              <a:t>17/09/2018</a:t>
             </a:fld>
             <a:endParaRPr lang="en-AU"/>
           </a:p>
@@ -2098,7 +2098,7 @@
           <a:p>
             <a:fld id="{185F0BFD-5608-4F22-A047-776EBFDB86C9}" type="datetimeFigureOut">
               <a:rPr lang="en-AU" smtClean="0"/>
-              <a:t>21/08/2018</a:t>
+              <a:t>17/09/2018</a:t>
             </a:fld>
             <a:endParaRPr lang="en-AU"/>
           </a:p>
@@ -2351,7 +2351,7 @@
           <a:p>
             <a:fld id="{185F0BFD-5608-4F22-A047-776EBFDB86C9}" type="datetimeFigureOut">
               <a:rPr lang="en-AU" smtClean="0"/>
-              <a:t>21/08/2018</a:t>
+              <a:t>17/09/2018</a:t>
             </a:fld>
             <a:endParaRPr lang="en-AU"/>
           </a:p>
@@ -2564,7 +2564,7 @@
           <a:p>
             <a:fld id="{185F0BFD-5608-4F22-A047-776EBFDB86C9}" type="datetimeFigureOut">
               <a:rPr lang="en-AU" smtClean="0"/>
-              <a:t>21/08/2018</a:t>
+              <a:t>17/09/2018</a:t>
             </a:fld>
             <a:endParaRPr lang="en-AU"/>
           </a:p>
@@ -5094,8 +5094,8 @@
           </a:prstGeom>
         </p:spPr>
       </p:pic>
-      <mc:AlternateContent xmlns:mc="http://schemas.openxmlformats.org/markup-compatibility/2006" xmlns:a14="http://schemas.microsoft.com/office/drawing/2010/main">
-        <mc:Choice Requires="a14">
+      <mc:AlternateContent xmlns:mc="http://schemas.openxmlformats.org/markup-compatibility/2006">
+        <mc:Choice xmlns:a14="http://schemas.microsoft.com/office/drawing/2010/main" Requires="a14">
           <p:sp>
             <p:nvSpPr>
               <p:cNvPr id="4" name="Rectangle 3"/>
@@ -5104,8 +5104,8 @@
             </p:nvSpPr>
             <p:spPr>
               <a:xfrm>
-                <a:off x="596017" y="5990230"/>
-                <a:ext cx="2162772" cy="369332"/>
+                <a:off x="991991" y="5990230"/>
+                <a:ext cx="914033" cy="369332"/>
               </a:xfrm>
               <a:prstGeom prst="rect">
                 <a:avLst/>
@@ -5131,52 +5131,7 @@
                           </a:solidFill>
                           <a:latin typeface="Cambria Math" panose="02040503050406030204" pitchFamily="18" charset="0"/>
                         </a:rPr>
-                        <m:t>𝑫𝒂𝒕𝒂</m:t>
-                      </m:r>
-                      <m:r>
-                        <a:rPr lang="en-AU" b="1" i="1" smtClean="0">
-                          <a:solidFill>
-                            <a:prstClr val="black"/>
-                          </a:solidFill>
-                          <a:latin typeface="Cambria Math" panose="02040503050406030204" pitchFamily="18" charset="0"/>
-                        </a:rPr>
-                        <m:t> </m:t>
-                      </m:r>
-                      <m:r>
-                        <a:rPr lang="en-AU" b="1" i="1" smtClean="0">
-                          <a:solidFill>
-                            <a:prstClr val="black"/>
-                          </a:solidFill>
-                          <a:latin typeface="Cambria Math" panose="02040503050406030204" pitchFamily="18" charset="0"/>
-                        </a:rPr>
-                        <m:t>𝑭𝒓𝒂𝒎𝒆</m:t>
-                      </m:r>
-                      <m:r>
-                        <a:rPr lang="en-AU" b="1" i="1" smtClean="0">
-                          <a:solidFill>
-                            <a:prstClr val="black"/>
-                          </a:solidFill>
-                          <a:latin typeface="Cambria Math" panose="02040503050406030204" pitchFamily="18" charset="0"/>
-                        </a:rPr>
-                        <m:t> (</m:t>
-                      </m:r>
-                      <m:r>
-                        <a:rPr lang="en-AU" b="1" i="1" smtClean="0">
-                          <a:solidFill>
-                            <a:prstClr val="black"/>
-                          </a:solidFill>
-                          <a:latin typeface="Cambria Math" panose="02040503050406030204" pitchFamily="18" charset="0"/>
-                        </a:rPr>
-                        <m:t>𝑫𝑭</m:t>
-                      </m:r>
-                      <m:r>
-                        <a:rPr lang="en-AU" b="1" i="1" smtClean="0">
-                          <a:solidFill>
-                            <a:prstClr val="black"/>
-                          </a:solidFill>
-                          <a:latin typeface="Cambria Math" panose="02040503050406030204" pitchFamily="18" charset="0"/>
-                        </a:rPr>
-                        <m:t>)</m:t>
+                        <m:t>𝑪𝒂𝒄𝒉𝒆</m:t>
                       </m:r>
                     </m:oMath>
                   </m:oMathPara>
@@ -5190,7 +5145,7 @@
             </p:txBody>
           </p:sp>
         </mc:Choice>
-        <mc:Fallback xmlns="">
+        <mc:Fallback>
           <p:sp>
             <p:nvSpPr>
               <p:cNvPr id="4" name="Rectangle 3"/>
@@ -5201,8 +5156,8 @@
             </p:nvSpPr>
             <p:spPr>
               <a:xfrm>
-                <a:off x="596017" y="5990230"/>
-                <a:ext cx="2162772" cy="369332"/>
+                <a:off x="991991" y="5990230"/>
+                <a:ext cx="914033" cy="369332"/>
               </a:xfrm>
               <a:prstGeom prst="rect">
                 <a:avLst/>
@@ -5210,7 +5165,7 @@
               <a:blipFill>
                 <a:blip r:embed="rId5"/>
                 <a:stretch>
-                  <a:fillRect b="-13333"/>
+                  <a:fillRect/>
                 </a:stretch>
               </a:blipFill>
             </p:spPr>
@@ -5414,8 +5369,8 @@
           </p:sp>
         </mc:Fallback>
       </mc:AlternateContent>
-      <mc:AlternateContent xmlns:mc="http://schemas.openxmlformats.org/markup-compatibility/2006">
-        <mc:Choice xmlns:a14="http://schemas.microsoft.com/office/drawing/2010/main" Requires="a14">
+      <mc:AlternateContent xmlns:mc="http://schemas.openxmlformats.org/markup-compatibility/2006" xmlns:a14="http://schemas.microsoft.com/office/drawing/2010/main">
+        <mc:Choice Requires="a14">
           <p:sp>
             <p:nvSpPr>
               <p:cNvPr id="16" name="TextBox 15"/>
@@ -5517,13 +5472,8 @@
                 </a14:m>
                 <a:r>
                   <a:rPr lang="en-AU" sz="2000" dirty="0" smtClean="0"/>
-                  <a:t> </a:t>
+                  <a:t> finds </a:t>
                 </a:r>
-                <a:r>
-                  <a:rPr lang="en-AU" sz="2000" dirty="0" smtClean="0"/>
-                  <a:t>finds </a:t>
-                </a:r>
-                <a:endParaRPr lang="en-AU" sz="2000" dirty="0" smtClean="0"/>
               </a:p>
               <a:p>
                 <a:pPr algn="ctr"/>
@@ -5562,18 +5512,14 @@
                 </a:r>
                 <a:r>
                   <a:rPr lang="en-AU" sz="2000" dirty="0" smtClean="0"/>
-                  <a:t>nd </a:t>
-                </a:r>
-                <a:r>
-                  <a:rPr lang="en-AU" sz="2000" dirty="0" smtClean="0"/>
-                  <a:t>returned to the function.  </a:t>
+                  <a:t>nd returned to the function.  </a:t>
                 </a:r>
                 <a:endParaRPr lang="en-AU" sz="2000" dirty="0"/>
               </a:p>
             </p:txBody>
           </p:sp>
         </mc:Choice>
-        <mc:Fallback>
+        <mc:Fallback xmlns="">
           <p:sp>
             <p:nvSpPr>
               <p:cNvPr id="16" name="TextBox 15"/>
@@ -5719,15 +5665,7 @@
                   <a:srgbClr val="FF0000"/>
                 </a:solidFill>
               </a:rPr>
-              <a:t>be </a:t>
-            </a:r>
-            <a:r>
-              <a:rPr lang="en-AU" sz="2000" b="1" smtClean="0">
-                <a:solidFill>
-                  <a:srgbClr val="FF0000"/>
-                </a:solidFill>
-              </a:rPr>
-              <a:t>known</a:t>
+              <a:t>be known</a:t>
             </a:r>
             <a:endParaRPr lang="en-AU" sz="2000" b="1" dirty="0" smtClean="0">
               <a:solidFill>

</xml_diff>